<commit_message>
Update week 7 documents.
</commit_message>
<xml_diff>
--- a/CPSC-24500/Week07/2017SpringW07Slides.pptx
+++ b/CPSC-24500/Week07/2017SpringW07Slides.pptx
@@ -220,7 +220,7 @@
           <a:p>
             <a:fld id="{91ED72D7-FE6F-4B82-8D31-76BC00B06094}" type="datetimeFigureOut">
               <a:rPr lang="en-US" smtClean="0"/>
-              <a:t>4/28/2017</a:t>
+              <a:t>4/29/2017</a:t>
             </a:fld>
             <a:endParaRPr lang="en-US" dirty="0"/>
           </a:p>
@@ -1467,6 +1467,75 @@
           <a:bodyPr/>
           <a:lstStyle/>
           <a:p>
+            <a:pPr marL="0" marR="0" lvl="0" indent="0" algn="l" defTabSz="914400" rtl="0" eaLnBrk="1" fontAlgn="auto" latinLnBrk="0" hangingPunct="1">
+              <a:lnSpc>
+                <a:spcPct val="100000"/>
+              </a:lnSpc>
+              <a:spcBef>
+                <a:spcPts val="0"/>
+              </a:spcBef>
+              <a:spcAft>
+                <a:spcPts val="0"/>
+              </a:spcAft>
+              <a:buClrTx/>
+              <a:buSzTx/>
+              <a:buFontTx/>
+              <a:buNone/>
+              <a:tabLst/>
+              <a:defRPr/>
+            </a:pPr>
+            <a:r>
+              <a:rPr lang="en-US" sz="1000" dirty="0"/>
+              <a:t>Week 7 Questions Assignment:</a:t>
+            </a:r>
+          </a:p>
+          <a:p>
+            <a:pPr marL="0" marR="0" lvl="0" indent="0" algn="l" defTabSz="914400" rtl="0" eaLnBrk="1" fontAlgn="auto" latinLnBrk="0" hangingPunct="1">
+              <a:lnSpc>
+                <a:spcPct val="100000"/>
+              </a:lnSpc>
+              <a:spcBef>
+                <a:spcPts val="0"/>
+              </a:spcBef>
+              <a:spcAft>
+                <a:spcPts val="0"/>
+              </a:spcAft>
+              <a:buClrTx/>
+              <a:buSzTx/>
+              <a:buFontTx/>
+              <a:buNone/>
+              <a:tabLst/>
+              <a:defRPr/>
+            </a:pPr>
+            <a:r>
+              <a:rPr lang="en-US" sz="1000">
+                <a:hlinkClick r:id="rId3"/>
+              </a:rPr>
+              <a:t>http://www.epogue.info/CPSC-24500/Week07/2017SpringW07QuestionsAssignment.docx</a:t>
+            </a:r>
+            <a:endParaRPr lang="en-US" sz="1000"/>
+          </a:p>
+          <a:p>
+            <a:pPr marL="0" marR="0" lvl="0" indent="0" algn="l" defTabSz="914400" rtl="0" eaLnBrk="1" fontAlgn="auto" latinLnBrk="0" hangingPunct="1">
+              <a:lnSpc>
+                <a:spcPct val="100000"/>
+              </a:lnSpc>
+              <a:spcBef>
+                <a:spcPts val="0"/>
+              </a:spcBef>
+              <a:spcAft>
+                <a:spcPts val="0"/>
+              </a:spcAft>
+              <a:buClrTx/>
+              <a:buSzTx/>
+              <a:buFontTx/>
+              <a:buNone/>
+              <a:tabLst/>
+              <a:defRPr/>
+            </a:pPr>
+            <a:endParaRPr lang="en-US" sz="1000" dirty="0"/>
+          </a:p>
+          <a:p>
             <a:pPr marL="0" indent="0">
               <a:buNone/>
             </a:pPr>
@@ -1722,6 +1791,55 @@
           <a:bodyPr/>
           <a:lstStyle/>
           <a:p>
+            <a:pPr marL="0" marR="0" lvl="0" indent="0" algn="l" defTabSz="914400" rtl="0" eaLnBrk="1" fontAlgn="auto" latinLnBrk="0" hangingPunct="1">
+              <a:lnSpc>
+                <a:spcPct val="100000"/>
+              </a:lnSpc>
+              <a:spcBef>
+                <a:spcPts val="0"/>
+              </a:spcBef>
+              <a:spcAft>
+                <a:spcPts val="0"/>
+              </a:spcAft>
+              <a:buClrTx/>
+              <a:buSzTx/>
+              <a:buFontTx/>
+              <a:buNone/>
+              <a:tabLst/>
+              <a:defRPr/>
+            </a:pPr>
+            <a:r>
+              <a:rPr lang="en-US" sz="1000" dirty="0"/>
+              <a:t>Week 7 Programming Assignment:</a:t>
+            </a:r>
+          </a:p>
+          <a:p>
+            <a:pPr marL="0" marR="0" lvl="0" indent="0" algn="l" defTabSz="914400" rtl="0" eaLnBrk="1" fontAlgn="auto" latinLnBrk="0" hangingPunct="1">
+              <a:lnSpc>
+                <a:spcPct val="100000"/>
+              </a:lnSpc>
+              <a:spcBef>
+                <a:spcPts val="0"/>
+              </a:spcBef>
+              <a:spcAft>
+                <a:spcPts val="0"/>
+              </a:spcAft>
+              <a:buClrTx/>
+              <a:buSzTx/>
+              <a:buFontTx/>
+              <a:buNone/>
+              <a:tabLst/>
+              <a:defRPr/>
+            </a:pPr>
+            <a:r>
+              <a:rPr lang="en-US" sz="1000" dirty="0">
+                <a:hlinkClick r:id="rId3"/>
+              </a:rPr>
+              <a:t>http://www.epogue.info/CPSC-24500/Week07/2017SpringW07ProgrammingAssignment.pdf</a:t>
+            </a:r>
+            <a:endParaRPr lang="en-US" sz="1000" dirty="0"/>
+          </a:p>
+          <a:p>
             <a:pPr marL="0" indent="0">
               <a:buNone/>
             </a:pPr>
@@ -2541,7 +2659,7 @@
           <a:p>
             <a:fld id="{969F32F5-AB1C-41B2-AE79-C9DE1D1745A4}" type="datetimeFigureOut">
               <a:rPr lang="en-US" smtClean="0"/>
-              <a:t>4/28/2017</a:t>
+              <a:t>4/29/2017</a:t>
             </a:fld>
             <a:endParaRPr lang="en-US" dirty="0"/>
           </a:p>
@@ -2709,7 +2827,7 @@
           <a:p>
             <a:fld id="{969F32F5-AB1C-41B2-AE79-C9DE1D1745A4}" type="datetimeFigureOut">
               <a:rPr lang="en-US" smtClean="0"/>
-              <a:t>4/28/2017</a:t>
+              <a:t>4/29/2017</a:t>
             </a:fld>
             <a:endParaRPr lang="en-US" dirty="0"/>
           </a:p>
@@ -2887,7 +3005,7 @@
           <a:p>
             <a:fld id="{969F32F5-AB1C-41B2-AE79-C9DE1D1745A4}" type="datetimeFigureOut">
               <a:rPr lang="en-US" smtClean="0"/>
-              <a:t>4/28/2017</a:t>
+              <a:t>4/29/2017</a:t>
             </a:fld>
             <a:endParaRPr lang="en-US" dirty="0"/>
           </a:p>
@@ -3055,7 +3173,7 @@
           <a:p>
             <a:fld id="{969F32F5-AB1C-41B2-AE79-C9DE1D1745A4}" type="datetimeFigureOut">
               <a:rPr lang="en-US" smtClean="0"/>
-              <a:t>4/28/2017</a:t>
+              <a:t>4/29/2017</a:t>
             </a:fld>
             <a:endParaRPr lang="en-US" dirty="0"/>
           </a:p>
@@ -3300,7 +3418,7 @@
           <a:p>
             <a:fld id="{969F32F5-AB1C-41B2-AE79-C9DE1D1745A4}" type="datetimeFigureOut">
               <a:rPr lang="en-US" smtClean="0"/>
-              <a:t>4/28/2017</a:t>
+              <a:t>4/29/2017</a:t>
             </a:fld>
             <a:endParaRPr lang="en-US" dirty="0"/>
           </a:p>
@@ -3529,7 +3647,7 @@
           <a:p>
             <a:fld id="{969F32F5-AB1C-41B2-AE79-C9DE1D1745A4}" type="datetimeFigureOut">
               <a:rPr lang="en-US" smtClean="0"/>
-              <a:t>4/28/2017</a:t>
+              <a:t>4/29/2017</a:t>
             </a:fld>
             <a:endParaRPr lang="en-US" dirty="0"/>
           </a:p>
@@ -3893,7 +4011,7 @@
           <a:p>
             <a:fld id="{969F32F5-AB1C-41B2-AE79-C9DE1D1745A4}" type="datetimeFigureOut">
               <a:rPr lang="en-US" smtClean="0"/>
-              <a:t>4/28/2017</a:t>
+              <a:t>4/29/2017</a:t>
             </a:fld>
             <a:endParaRPr lang="en-US" dirty="0"/>
           </a:p>
@@ -4010,7 +4128,7 @@
           <a:p>
             <a:fld id="{969F32F5-AB1C-41B2-AE79-C9DE1D1745A4}" type="datetimeFigureOut">
               <a:rPr lang="en-US" smtClean="0"/>
-              <a:t>4/28/2017</a:t>
+              <a:t>4/29/2017</a:t>
             </a:fld>
             <a:endParaRPr lang="en-US" dirty="0"/>
           </a:p>
@@ -4105,7 +4223,7 @@
           <a:p>
             <a:fld id="{969F32F5-AB1C-41B2-AE79-C9DE1D1745A4}" type="datetimeFigureOut">
               <a:rPr lang="en-US" smtClean="0"/>
-              <a:t>4/28/2017</a:t>
+              <a:t>4/29/2017</a:t>
             </a:fld>
             <a:endParaRPr lang="en-US" dirty="0"/>
           </a:p>
@@ -4380,7 +4498,7 @@
           <a:p>
             <a:fld id="{969F32F5-AB1C-41B2-AE79-C9DE1D1745A4}" type="datetimeFigureOut">
               <a:rPr lang="en-US" smtClean="0"/>
-              <a:t>4/28/2017</a:t>
+              <a:t>4/29/2017</a:t>
             </a:fld>
             <a:endParaRPr lang="en-US" dirty="0"/>
           </a:p>
@@ -4632,7 +4750,7 @@
           <a:p>
             <a:fld id="{969F32F5-AB1C-41B2-AE79-C9DE1D1745A4}" type="datetimeFigureOut">
               <a:rPr lang="en-US" smtClean="0"/>
-              <a:t>4/28/2017</a:t>
+              <a:t>4/29/2017</a:t>
             </a:fld>
             <a:endParaRPr lang="en-US" dirty="0"/>
           </a:p>
@@ -4843,7 +4961,7 @@
           <a:p>
             <a:fld id="{969F32F5-AB1C-41B2-AE79-C9DE1D1745A4}" type="datetimeFigureOut">
               <a:rPr lang="en-US" smtClean="0"/>
-              <a:t>4/28/2017</a:t>
+              <a:t>4/29/2017</a:t>
             </a:fld>
             <a:endParaRPr lang="en-US" dirty="0"/>
           </a:p>
@@ -6809,6 +6927,16 @@
             <a:pPr marL="0" indent="0">
               <a:buNone/>
             </a:pPr>
+            <a:r>
+              <a:rPr lang="en-US" sz="2000" dirty="0"/>
+              <a:t>Week 7 Questions Assignment </a:t>
+            </a:r>
+            <a:r>
+              <a:rPr lang="en-US" sz="2000" u="sng" dirty="0">
+                <a:hlinkClick r:id="rId3"/>
+              </a:rPr>
+              <a:t>[link]</a:t>
+            </a:r>
             <a:endParaRPr lang="en-US" sz="2000" dirty="0"/>
           </a:p>
         </p:txBody>
@@ -7133,6 +7261,22 @@
             <a:normAutofit/>
           </a:bodyPr>
           <a:lstStyle/>
+          <a:p>
+            <a:pPr marL="0" indent="0">
+              <a:buNone/>
+            </a:pPr>
+            <a:r>
+              <a:rPr lang="en-US" sz="2000" dirty="0"/>
+              <a:t>Week 7 Programming Assignment </a:t>
+            </a:r>
+            <a:r>
+              <a:rPr lang="en-US" sz="2000" u="sng" dirty="0">
+                <a:hlinkClick r:id="rId3"/>
+              </a:rPr>
+              <a:t>[link]</a:t>
+            </a:r>
+            <a:endParaRPr lang="en-US" sz="2000" dirty="0"/>
+          </a:p>
           <a:p>
             <a:pPr marL="0" indent="0">
               <a:buNone/>
@@ -8705,12 +8849,9 @@
 </file>
 
 <file path=customXml/item1.xml><?xml version="1.0" encoding="utf-8"?>
-<?mso-contentType ?>
-<FormTemplates xmlns="http://schemas.microsoft.com/sharepoint/v3/contenttype/forms">
-  <Display>DocumentLibraryForm</Display>
-  <Edit>DocumentLibraryForm</Edit>
-  <New>DocumentLibraryForm</New>
-</FormTemplates>
+<p:properties xmlns:p="http://schemas.microsoft.com/office/2006/metadata/properties" xmlns:xsi="http://www.w3.org/2001/XMLSchema-instance" xmlns:pc="http://schemas.microsoft.com/office/infopath/2007/PartnerControls">
+  <documentManagement/>
+</p:properties>
 </file>
 
 <file path=customXml/item2.xml><?xml version="1.0" encoding="utf-8"?>
@@ -8828,15 +8969,25 @@
 </file>
 
 <file path=customXml/item3.xml><?xml version="1.0" encoding="utf-8"?>
-<p:properties xmlns:p="http://schemas.microsoft.com/office/2006/metadata/properties" xmlns:xsi="http://www.w3.org/2001/XMLSchema-instance" xmlns:pc="http://schemas.microsoft.com/office/infopath/2007/PartnerControls">
-  <documentManagement/>
-</p:properties>
+<?mso-contentType ?>
+<FormTemplates xmlns="http://schemas.microsoft.com/sharepoint/v3/contenttype/forms">
+  <Display>DocumentLibraryForm</Display>
+  <Edit>DocumentLibraryForm</Edit>
+  <New>DocumentLibraryForm</New>
+</FormTemplates>
 </file>
 
 <file path=customXml/itemProps1.xml><?xml version="1.0" encoding="utf-8"?>
-<ds:datastoreItem xmlns:ds="http://schemas.openxmlformats.org/officeDocument/2006/customXml" ds:itemID="{87FD8B20-B89A-4B23-9329-175195DD4D8A}">
+<ds:datastoreItem xmlns:ds="http://schemas.openxmlformats.org/officeDocument/2006/customXml" ds:itemID="{3473EA1A-2744-48E8-B2A3-4F89C0FC849C}">
   <ds:schemaRefs>
-    <ds:schemaRef ds:uri="http://schemas.microsoft.com/sharepoint/v3/contenttype/forms"/>
+    <ds:schemaRef ds:uri="http://schemas.microsoft.com/office/2006/documentManagement/types"/>
+    <ds:schemaRef ds:uri="http://schemas.microsoft.com/office/infopath/2007/PartnerControls"/>
+    <ds:schemaRef ds:uri="http://purl.org/dc/elements/1.1/"/>
+    <ds:schemaRef ds:uri="http://schemas.microsoft.com/office/2006/metadata/properties"/>
+    <ds:schemaRef ds:uri="http://purl.org/dc/terms/"/>
+    <ds:schemaRef ds:uri="http://schemas.openxmlformats.org/package/2006/metadata/core-properties"/>
+    <ds:schemaRef ds:uri="http://www.w3.org/XML/1998/namespace"/>
+    <ds:schemaRef ds:uri="http://purl.org/dc/dcmitype/"/>
   </ds:schemaRefs>
 </ds:datastoreItem>
 </file>
@@ -8858,16 +9009,9 @@
 </file>
 
 <file path=customXml/itemProps3.xml><?xml version="1.0" encoding="utf-8"?>
-<ds:datastoreItem xmlns:ds="http://schemas.openxmlformats.org/officeDocument/2006/customXml" ds:itemID="{3473EA1A-2744-48E8-B2A3-4F89C0FC849C}">
+<ds:datastoreItem xmlns:ds="http://schemas.openxmlformats.org/officeDocument/2006/customXml" ds:itemID="{87FD8B20-B89A-4B23-9329-175195DD4D8A}">
   <ds:schemaRefs>
-    <ds:schemaRef ds:uri="http://purl.org/dc/elements/1.1/"/>
-    <ds:schemaRef ds:uri="http://schemas.microsoft.com/office/2006/metadata/properties"/>
-    <ds:schemaRef ds:uri="http://schemas.microsoft.com/office/2006/documentManagement/types"/>
-    <ds:schemaRef ds:uri="http://schemas.openxmlformats.org/package/2006/metadata/core-properties"/>
-    <ds:schemaRef ds:uri="http://purl.org/dc/dcmitype/"/>
-    <ds:schemaRef ds:uri="http://schemas.microsoft.com/office/infopath/2007/PartnerControls"/>
-    <ds:schemaRef ds:uri="http://www.w3.org/XML/1998/namespace"/>
-    <ds:schemaRef ds:uri="http://purl.org/dc/terms/"/>
+    <ds:schemaRef ds:uri="http://schemas.microsoft.com/sharepoint/v3/contenttype/forms"/>
   </ds:schemaRefs>
 </ds:datastoreItem>
 </file>
</xml_diff>

<commit_message>
Udate documents and add html references.
</commit_message>
<xml_diff>
--- a/CPSC-24500/Week07/2017SpringW07Slides.pptx
+++ b/CPSC-24500/Week07/2017SpringW07Slides.pptx
@@ -5,7 +5,7 @@
     <p:sldMasterId id="2147483648" r:id="rId4"/>
   </p:sldMasterIdLst>
   <p:notesMasterIdLst>
-    <p:notesMasterId r:id="rId29"/>
+    <p:notesMasterId r:id="rId28"/>
   </p:notesMasterIdLst>
   <p:sldIdLst>
     <p:sldId id="381" r:id="rId5"/>
@@ -26,12 +26,11 @@
     <p:sldId id="533" r:id="rId20"/>
     <p:sldId id="534" r:id="rId21"/>
     <p:sldId id="467" r:id="rId22"/>
-    <p:sldId id="497" r:id="rId23"/>
-    <p:sldId id="535" r:id="rId24"/>
-    <p:sldId id="537" r:id="rId25"/>
-    <p:sldId id="475" r:id="rId26"/>
-    <p:sldId id="538" r:id="rId27"/>
-    <p:sldId id="490" r:id="rId28"/>
+    <p:sldId id="535" r:id="rId23"/>
+    <p:sldId id="537" r:id="rId24"/>
+    <p:sldId id="475" r:id="rId25"/>
+    <p:sldId id="538" r:id="rId26"/>
+    <p:sldId id="490" r:id="rId27"/>
   </p:sldIdLst>
   <p:sldSz cx="12192000" cy="6858000"/>
   <p:notesSz cx="7315200" cy="9601200"/>
@@ -141,6 +140,10 @@
 </p:presentation>
 </file>
 
+<file path=ppt/revisionInfo.xml><?xml version="1.0" encoding="utf-8"?>
+<p1510:revInfo xmlns:a="http://schemas.openxmlformats.org/drawingml/2006/main" xmlns:r="http://schemas.openxmlformats.org/officeDocument/2006/relationships" xmlns:p1510="http://schemas.microsoft.com/office/powerpoint/2015/10/main"/>
+</file>
+
 <file path=ppt/notesMasters/notesMaster1.xml><?xml version="1.0" encoding="utf-8"?>
 <p:notesMaster xmlns:a="http://schemas.openxmlformats.org/drawingml/2006/main" xmlns:r="http://schemas.openxmlformats.org/officeDocument/2006/relationships" xmlns:p="http://schemas.openxmlformats.org/presentationml/2006/main">
   <p:cSld>
@@ -223,7 +226,7 @@
           <a:p>
             <a:fld id="{91ED72D7-FE6F-4B82-8D31-76BC00B06094}" type="datetimeFigureOut">
               <a:rPr lang="en-US" smtClean="0"/>
-              <a:t>4/29/2017</a:t>
+              <a:t>5/1/2017</a:t>
             </a:fld>
             <a:endParaRPr lang="en-US" dirty="0"/>
           </a:p>
@@ -1386,7 +1389,7 @@
           <a:bodyPr/>
           <a:lstStyle/>
           <a:p>
-            <a:endParaRPr lang="en-US" dirty="0"/>
+            <a:endParaRPr lang="en-US" sz="1000" dirty="0"/>
           </a:p>
         </p:txBody>
       </p:sp>
@@ -1416,7 +1419,7 @@
     </p:spTree>
     <p:extLst>
       <p:ext uri="{BB962C8B-B14F-4D97-AF65-F5344CB8AC3E}">
-        <p14:creationId xmlns:p14="http://schemas.microsoft.com/office/powerpoint/2010/main" val="4010604235"/>
+        <p14:creationId xmlns:p14="http://schemas.microsoft.com/office/powerpoint/2010/main" val="3734680289"/>
       </p:ext>
     </p:extLst>
   </p:cSld>
@@ -1626,7 +1629,55 @@
           <a:bodyPr/>
           <a:lstStyle/>
           <a:p>
+            <a:r>
+              <a:rPr lang="en-US" sz="1000" dirty="0"/>
+              <a:t>TCP/IP: Transmission Control Protocol / Internet Protocol </a:t>
+            </a:r>
+          </a:p>
+          <a:p>
+            <a:r>
+              <a:rPr lang="en-US" sz="1000" dirty="0"/>
+              <a:t>HTTP: Hypertext Transfer Protocol </a:t>
+            </a:r>
+          </a:p>
+          <a:p>
+            <a:r>
+              <a:rPr lang="en-US" sz="1000" dirty="0"/>
+              <a:t>HTTPs: Hypertext Transfer Protocol Secure</a:t>
+            </a:r>
+          </a:p>
+          <a:p>
+            <a:r>
+              <a:rPr lang="en-US" sz="1000" dirty="0"/>
+              <a:t>SSL: Secure Sockets Layer</a:t>
+            </a:r>
+          </a:p>
+          <a:p>
+            <a:r>
+              <a:rPr lang="en-US" sz="1000" dirty="0"/>
+              <a:t>HTML: Hypertext Markup Language</a:t>
+            </a:r>
+          </a:p>
+          <a:p>
+            <a:r>
+              <a:rPr lang="en-US" sz="1000" dirty="0"/>
+              <a:t>XML: Extensible Markup Language</a:t>
+            </a:r>
+          </a:p>
+          <a:p>
+            <a:r>
+              <a:rPr lang="en-US" sz="1000" dirty="0"/>
+              <a:t>JSON: </a:t>
+            </a:r>
+          </a:p>
+          <a:p>
             <a:endParaRPr lang="en-US" sz="1000" dirty="0"/>
+          </a:p>
+          <a:p>
+            <a:r>
+              <a:rPr lang="en-US" sz="1000" dirty="0"/>
+              <a:t>Web Server: A server that utilizes TCP/IP and responds on Port 80 from a given IP address using HTTP and generally returns HTML.</a:t>
+            </a:r>
           </a:p>
         </p:txBody>
       </p:sp>
@@ -1649,14 +1700,14 @@
               <a:rPr lang="en-US" smtClean="0"/>
               <a:t>20</a:t>
             </a:fld>
-            <a:endParaRPr lang="en-US" dirty="0"/>
+            <a:endParaRPr lang="en-US"/>
           </a:p>
         </p:txBody>
       </p:sp>
     </p:spTree>
     <p:extLst>
       <p:ext uri="{BB962C8B-B14F-4D97-AF65-F5344CB8AC3E}">
-        <p14:creationId xmlns:p14="http://schemas.microsoft.com/office/powerpoint/2010/main" val="3734680289"/>
+        <p14:creationId xmlns:p14="http://schemas.microsoft.com/office/powerpoint/2010/main" val="556053018"/>
       </p:ext>
     </p:extLst>
   </p:cSld>
@@ -1710,55 +1761,7 @@
           <a:bodyPr/>
           <a:lstStyle/>
           <a:p>
-            <a:r>
-              <a:rPr lang="en-US" sz="1000" dirty="0"/>
-              <a:t>TCP/IP: Transmission Control Protocol / Internet Protocol </a:t>
-            </a:r>
-          </a:p>
-          <a:p>
-            <a:r>
-              <a:rPr lang="en-US" sz="1000" dirty="0"/>
-              <a:t>HTTP: Hypertext Transfer Protocol </a:t>
-            </a:r>
-          </a:p>
-          <a:p>
-            <a:r>
-              <a:rPr lang="en-US" sz="1000" dirty="0"/>
-              <a:t>HTTPs: Hypertext Transfer Protocol Secure</a:t>
-            </a:r>
-          </a:p>
-          <a:p>
-            <a:r>
-              <a:rPr lang="en-US" sz="1000" dirty="0"/>
-              <a:t>SSL: Secure Sockets Layer</a:t>
-            </a:r>
-          </a:p>
-          <a:p>
-            <a:r>
-              <a:rPr lang="en-US" sz="1000" dirty="0"/>
-              <a:t>HTML: Hypertext Markup Language</a:t>
-            </a:r>
-          </a:p>
-          <a:p>
-            <a:r>
-              <a:rPr lang="en-US" sz="1000" dirty="0"/>
-              <a:t>XML: Extensible Markup Language</a:t>
-            </a:r>
-          </a:p>
-          <a:p>
-            <a:r>
-              <a:rPr lang="en-US" sz="1000" dirty="0"/>
-              <a:t>JSON: </a:t>
-            </a:r>
-          </a:p>
-          <a:p>
-            <a:endParaRPr lang="en-US" sz="1000" dirty="0"/>
-          </a:p>
-          <a:p>
-            <a:r>
-              <a:rPr lang="en-US" sz="1000" dirty="0"/>
-              <a:t>Web Server: A server that utilizes TCP/IP and responds on Port 80 from a given IP address using HTTP and generally returns HTML.</a:t>
-            </a:r>
+            <a:endParaRPr lang="en-US" dirty="0"/>
           </a:p>
         </p:txBody>
       </p:sp>
@@ -1781,14 +1784,14 @@
               <a:rPr lang="en-US" smtClean="0"/>
               <a:t>21</a:t>
             </a:fld>
-            <a:endParaRPr lang="en-US"/>
+            <a:endParaRPr lang="en-US" dirty="0"/>
           </a:p>
         </p:txBody>
       </p:sp>
     </p:spTree>
     <p:extLst>
       <p:ext uri="{BB962C8B-B14F-4D97-AF65-F5344CB8AC3E}">
-        <p14:creationId xmlns:p14="http://schemas.microsoft.com/office/powerpoint/2010/main" val="556053018"/>
+        <p14:creationId xmlns:p14="http://schemas.microsoft.com/office/powerpoint/2010/main" val="4053031286"/>
       </p:ext>
     </p:extLst>
   </p:cSld>
@@ -1842,7 +1845,7 @@
           <a:bodyPr/>
           <a:lstStyle/>
           <a:p>
-            <a:endParaRPr lang="en-US" dirty="0"/>
+            <a:endParaRPr lang="en-US" sz="1000" dirty="0"/>
           </a:p>
         </p:txBody>
       </p:sp>
@@ -1872,7 +1875,7 @@
     </p:spTree>
     <p:extLst>
       <p:ext uri="{BB962C8B-B14F-4D97-AF65-F5344CB8AC3E}">
-        <p14:creationId xmlns:p14="http://schemas.microsoft.com/office/powerpoint/2010/main" val="4053031286"/>
+        <p14:creationId xmlns:p14="http://schemas.microsoft.com/office/powerpoint/2010/main" val="3164610844"/>
       </p:ext>
     </p:extLst>
   </p:cSld>
@@ -1948,90 +1951,6 @@
             <a:fld id="{5394DE12-7B9B-46AA-AC19-C30A49928B9B}" type="slidenum">
               <a:rPr lang="en-US" smtClean="0"/>
               <a:t>23</a:t>
-            </a:fld>
-            <a:endParaRPr lang="en-US" dirty="0"/>
-          </a:p>
-        </p:txBody>
-      </p:sp>
-    </p:spTree>
-    <p:extLst>
-      <p:ext uri="{BB962C8B-B14F-4D97-AF65-F5344CB8AC3E}">
-        <p14:creationId xmlns:p14="http://schemas.microsoft.com/office/powerpoint/2010/main" val="3164610844"/>
-      </p:ext>
-    </p:extLst>
-  </p:cSld>
-  <p:clrMapOvr>
-    <a:masterClrMapping/>
-  </p:clrMapOvr>
-</p:notes>
-</file>
-
-<file path=ppt/notesSlides/notesSlide24.xml><?xml version="1.0" encoding="utf-8"?>
-<p:notes xmlns:a="http://schemas.openxmlformats.org/drawingml/2006/main" xmlns:r="http://schemas.openxmlformats.org/officeDocument/2006/relationships" xmlns:p="http://schemas.openxmlformats.org/presentationml/2006/main">
-  <p:cSld>
-    <p:spTree>
-      <p:nvGrpSpPr>
-        <p:cNvPr id="1" name=""/>
-        <p:cNvGrpSpPr/>
-        <p:nvPr/>
-      </p:nvGrpSpPr>
-      <p:grpSpPr>
-        <a:xfrm>
-          <a:off x="0" y="0"/>
-          <a:ext cx="0" cy="0"/>
-          <a:chOff x="0" y="0"/>
-          <a:chExt cx="0" cy="0"/>
-        </a:xfrm>
-      </p:grpSpPr>
-      <p:sp>
-        <p:nvSpPr>
-          <p:cNvPr id="2" name="Slide Image Placeholder 1"/>
-          <p:cNvSpPr>
-            <a:spLocks noGrp="1" noRot="1" noChangeAspect="1"/>
-          </p:cNvSpPr>
-          <p:nvPr>
-            <p:ph type="sldImg"/>
-          </p:nvPr>
-        </p:nvSpPr>
-        <p:spPr/>
-      </p:sp>
-      <p:sp>
-        <p:nvSpPr>
-          <p:cNvPr id="3" name="Notes Placeholder 2"/>
-          <p:cNvSpPr>
-            <a:spLocks noGrp="1"/>
-          </p:cNvSpPr>
-          <p:nvPr>
-            <p:ph type="body" idx="1"/>
-          </p:nvPr>
-        </p:nvSpPr>
-        <p:spPr/>
-        <p:txBody>
-          <a:bodyPr/>
-          <a:lstStyle/>
-          <a:p>
-            <a:endParaRPr lang="en-US" sz="1000" dirty="0"/>
-          </a:p>
-        </p:txBody>
-      </p:sp>
-      <p:sp>
-        <p:nvSpPr>
-          <p:cNvPr id="4" name="Slide Number Placeholder 3"/>
-          <p:cNvSpPr>
-            <a:spLocks noGrp="1"/>
-          </p:cNvSpPr>
-          <p:nvPr>
-            <p:ph type="sldNum" sz="quarter" idx="10"/>
-          </p:nvPr>
-        </p:nvSpPr>
-        <p:spPr/>
-        <p:txBody>
-          <a:bodyPr/>
-          <a:lstStyle/>
-          <a:p>
-            <a:fld id="{5394DE12-7B9B-46AA-AC19-C30A49928B9B}" type="slidenum">
-              <a:rPr lang="en-US" smtClean="0"/>
-              <a:t>24</a:t>
             </a:fld>
             <a:endParaRPr lang="en-US" dirty="0"/>
           </a:p>
@@ -2962,7 +2881,7 @@
           <a:p>
             <a:fld id="{969F32F5-AB1C-41B2-AE79-C9DE1D1745A4}" type="datetimeFigureOut">
               <a:rPr lang="en-US" smtClean="0"/>
-              <a:t>4/29/2017</a:t>
+              <a:t>5/1/2017</a:t>
             </a:fld>
             <a:endParaRPr lang="en-US" dirty="0"/>
           </a:p>
@@ -3130,7 +3049,7 @@
           <a:p>
             <a:fld id="{969F32F5-AB1C-41B2-AE79-C9DE1D1745A4}" type="datetimeFigureOut">
               <a:rPr lang="en-US" smtClean="0"/>
-              <a:t>4/29/2017</a:t>
+              <a:t>5/1/2017</a:t>
             </a:fld>
             <a:endParaRPr lang="en-US" dirty="0"/>
           </a:p>
@@ -3308,7 +3227,7 @@
           <a:p>
             <a:fld id="{969F32F5-AB1C-41B2-AE79-C9DE1D1745A4}" type="datetimeFigureOut">
               <a:rPr lang="en-US" smtClean="0"/>
-              <a:t>4/29/2017</a:t>
+              <a:t>5/1/2017</a:t>
             </a:fld>
             <a:endParaRPr lang="en-US" dirty="0"/>
           </a:p>
@@ -3476,7 +3395,7 @@
           <a:p>
             <a:fld id="{969F32F5-AB1C-41B2-AE79-C9DE1D1745A4}" type="datetimeFigureOut">
               <a:rPr lang="en-US" smtClean="0"/>
-              <a:t>4/29/2017</a:t>
+              <a:t>5/1/2017</a:t>
             </a:fld>
             <a:endParaRPr lang="en-US" dirty="0"/>
           </a:p>
@@ -3721,7 +3640,7 @@
           <a:p>
             <a:fld id="{969F32F5-AB1C-41B2-AE79-C9DE1D1745A4}" type="datetimeFigureOut">
               <a:rPr lang="en-US" smtClean="0"/>
-              <a:t>4/29/2017</a:t>
+              <a:t>5/1/2017</a:t>
             </a:fld>
             <a:endParaRPr lang="en-US" dirty="0"/>
           </a:p>
@@ -3950,7 +3869,7 @@
           <a:p>
             <a:fld id="{969F32F5-AB1C-41B2-AE79-C9DE1D1745A4}" type="datetimeFigureOut">
               <a:rPr lang="en-US" smtClean="0"/>
-              <a:t>4/29/2017</a:t>
+              <a:t>5/1/2017</a:t>
             </a:fld>
             <a:endParaRPr lang="en-US" dirty="0"/>
           </a:p>
@@ -4314,7 +4233,7 @@
           <a:p>
             <a:fld id="{969F32F5-AB1C-41B2-AE79-C9DE1D1745A4}" type="datetimeFigureOut">
               <a:rPr lang="en-US" smtClean="0"/>
-              <a:t>4/29/2017</a:t>
+              <a:t>5/1/2017</a:t>
             </a:fld>
             <a:endParaRPr lang="en-US" dirty="0"/>
           </a:p>
@@ -4431,7 +4350,7 @@
           <a:p>
             <a:fld id="{969F32F5-AB1C-41B2-AE79-C9DE1D1745A4}" type="datetimeFigureOut">
               <a:rPr lang="en-US" smtClean="0"/>
-              <a:t>4/29/2017</a:t>
+              <a:t>5/1/2017</a:t>
             </a:fld>
             <a:endParaRPr lang="en-US" dirty="0"/>
           </a:p>
@@ -4526,7 +4445,7 @@
           <a:p>
             <a:fld id="{969F32F5-AB1C-41B2-AE79-C9DE1D1745A4}" type="datetimeFigureOut">
               <a:rPr lang="en-US" smtClean="0"/>
-              <a:t>4/29/2017</a:t>
+              <a:t>5/1/2017</a:t>
             </a:fld>
             <a:endParaRPr lang="en-US" dirty="0"/>
           </a:p>
@@ -4801,7 +4720,7 @@
           <a:p>
             <a:fld id="{969F32F5-AB1C-41B2-AE79-C9DE1D1745A4}" type="datetimeFigureOut">
               <a:rPr lang="en-US" smtClean="0"/>
-              <a:t>4/29/2017</a:t>
+              <a:t>5/1/2017</a:t>
             </a:fld>
             <a:endParaRPr lang="en-US" dirty="0"/>
           </a:p>
@@ -5053,7 +4972,7 @@
           <a:p>
             <a:fld id="{969F32F5-AB1C-41B2-AE79-C9DE1D1745A4}" type="datetimeFigureOut">
               <a:rPr lang="en-US" smtClean="0"/>
-              <a:t>4/29/2017</a:t>
+              <a:t>5/1/2017</a:t>
             </a:fld>
             <a:endParaRPr lang="en-US" dirty="0"/>
           </a:p>
@@ -5264,7 +5183,7 @@
           <a:p>
             <a:fld id="{969F32F5-AB1C-41B2-AE79-C9DE1D1745A4}" type="datetimeFigureOut">
               <a:rPr lang="en-US" smtClean="0"/>
-              <a:t>4/29/2017</a:t>
+              <a:t>5/1/2017</a:t>
             </a:fld>
             <a:endParaRPr lang="en-US" dirty="0"/>
           </a:p>
@@ -7042,16 +6961,6 @@
 <file path=ppt/slides/slide19.xml><?xml version="1.0" encoding="utf-8"?>
 <p:sld xmlns:a="http://schemas.openxmlformats.org/drawingml/2006/main" xmlns:r="http://schemas.openxmlformats.org/officeDocument/2006/relationships" xmlns:p="http://schemas.openxmlformats.org/presentationml/2006/main">
   <p:cSld>
-    <p:bg>
-      <p:bgPr>
-        <a:solidFill>
-          <a:schemeClr val="bg1">
-            <a:lumMod val="75000"/>
-          </a:schemeClr>
-        </a:solidFill>
-        <a:effectLst/>
-      </p:bgPr>
-    </p:bg>
     <p:spTree>
       <p:nvGrpSpPr>
         <p:cNvPr id="1" name=""/>
@@ -7073,13 +6982,13 @@
             <a:spLocks noGrp="1"/>
           </p:cNvSpPr>
           <p:nvPr>
-            <p:ph type="ctrTitle"/>
+            <p:ph type="title"/>
           </p:nvPr>
         </p:nvSpPr>
         <p:spPr>
           <a:xfrm>
-            <a:off x="1524000" y="1122363"/>
-            <a:ext cx="9144000" cy="2387600"/>
+            <a:off x="838200" y="365126"/>
+            <a:ext cx="6113662" cy="1409174"/>
           </a:xfrm>
         </p:spPr>
         <p:txBody>
@@ -7089,67 +6998,154 @@
           <a:lstStyle/>
           <a:p>
             <a:r>
-              <a:rPr lang="en-US" sz="4800" dirty="0"/>
-              <a:t>End of Session</a:t>
-            </a:r>
-          </a:p>
-        </p:txBody>
-      </p:sp>
-      <p:sp>
-        <p:nvSpPr>
-          <p:cNvPr id="3" name="Subtitle 2"/>
-          <p:cNvSpPr>
-            <a:spLocks noGrp="1"/>
-          </p:cNvSpPr>
-          <p:nvPr>
-            <p:ph type="subTitle" idx="1"/>
-          </p:nvPr>
-        </p:nvSpPr>
+              <a:rPr lang="en-US" sz="3600" dirty="0"/>
+              <a:t>Object-Oriented Programming</a:t>
+            </a:r>
+            <a:br>
+              <a:rPr lang="en-US" sz="3600" dirty="0"/>
+            </a:br>
+            <a:r>
+              <a:rPr lang="en-US" sz="1800" dirty="0"/>
+              <a:t>Session: Week 7 Session 2 </a:t>
+            </a:r>
+            <a:br>
+              <a:rPr lang="en-US" sz="1800" dirty="0"/>
+            </a:br>
+            <a:r>
+              <a:rPr lang="en-US" sz="1800" dirty="0"/>
+              <a:t>Instructor: Eric Pogue</a:t>
+            </a:r>
+            <a:endParaRPr lang="en-US" sz="1800" b="1" i="1" u="sng" dirty="0"/>
+          </a:p>
+        </p:txBody>
+      </p:sp>
+      <p:pic>
+        <p:nvPicPr>
+          <p:cNvPr id="4" name="Content Placeholder 4"/>
+          <p:cNvPicPr>
+            <a:picLocks noChangeAspect="1"/>
+          </p:cNvPicPr>
+          <p:nvPr/>
+        </p:nvPicPr>
+        <p:blipFill>
+          <a:blip r:embed="rId3"/>
+          <a:stretch>
+            <a:fillRect/>
+          </a:stretch>
+        </p:blipFill>
         <p:spPr>
           <a:xfrm>
-            <a:off x="1524000" y="3602038"/>
-            <a:ext cx="9144000" cy="2198022"/>
+            <a:off x="9072894" y="182925"/>
+            <a:ext cx="2656367" cy="1366321"/>
+          </a:xfrm>
+          <a:prstGeom prst="rect">
+            <a:avLst/>
+          </a:prstGeom>
+        </p:spPr>
+      </p:pic>
+      <p:sp>
+        <p:nvSpPr>
+          <p:cNvPr id="10" name="Content Placeholder 2"/>
+          <p:cNvSpPr>
+            <a:spLocks noGrp="1"/>
+          </p:cNvSpPr>
+          <p:nvPr>
+            <p:ph idx="1"/>
+          </p:nvPr>
+        </p:nvSpPr>
+        <p:spPr>
+          <a:xfrm>
+            <a:off x="838200" y="1884313"/>
+            <a:ext cx="10718950" cy="4571242"/>
           </a:xfrm>
         </p:spPr>
         <p:txBody>
           <a:bodyPr>
-            <a:normAutofit/>
+            <a:noAutofit/>
           </a:bodyPr>
           <a:lstStyle/>
           <a:p>
-            <a:pPr algn="l"/>
-            <a:r>
-              <a:rPr lang="en-US" dirty="0"/>
-              <a:t>Course Number: CPSC-24500</a:t>
-            </a:r>
-          </a:p>
-          <a:p>
-            <a:pPr algn="l"/>
-            <a:r>
-              <a:rPr lang="en-US" dirty="0"/>
-              <a:t>Week: 7</a:t>
-            </a:r>
-          </a:p>
-          <a:p>
-            <a:pPr algn="l"/>
-            <a:r>
-              <a:rPr lang="en-US" dirty="0"/>
-              <a:t>Session: 2</a:t>
-            </a:r>
-          </a:p>
-          <a:p>
-            <a:pPr algn="l"/>
-            <a:r>
-              <a:rPr lang="en-US" dirty="0"/>
-              <a:t>Instructor: Eric Pogue</a:t>
-            </a:r>
+            <a:pPr marL="0" indent="0">
+              <a:buNone/>
+            </a:pPr>
+            <a:r>
+              <a:rPr lang="en-US" sz="2000" u="sng" dirty="0" err="1"/>
+              <a:t>HideDataDownloadXML</a:t>
+            </a:r>
+            <a:r>
+              <a:rPr lang="en-US" sz="2000" u="sng" dirty="0"/>
+              <a:t> Example:</a:t>
+            </a:r>
+          </a:p>
+          <a:p>
+            <a:pPr marL="457200" indent="-457200">
+              <a:buFont typeface="+mj-lt"/>
+              <a:buAutoNum type="arabicPeriod"/>
+            </a:pPr>
+            <a:r>
+              <a:rPr lang="en-US" sz="2000" dirty="0"/>
+              <a:t>Develop  application entirely in Visual Studio 2017 and C#</a:t>
+            </a:r>
+          </a:p>
+          <a:p>
+            <a:pPr marL="457200" indent="-457200">
+              <a:buFont typeface="+mj-lt"/>
+              <a:buAutoNum type="arabicPeriod"/>
+            </a:pPr>
+            <a:r>
+              <a:rPr lang="en-US" sz="2000" dirty="0"/>
+              <a:t>Take in one command line argument that is the URL to download</a:t>
+            </a:r>
+          </a:p>
+          <a:p>
+            <a:pPr marL="457200" indent="-457200">
+              <a:buFont typeface="+mj-lt"/>
+              <a:buAutoNum type="arabicPeriod"/>
+            </a:pPr>
+            <a:r>
+              <a:rPr lang="en-US" sz="2000" dirty="0"/>
+              <a:t>Utilize Web (HTTP) protocols to download HTML and XML files </a:t>
+            </a:r>
+          </a:p>
+          <a:p>
+            <a:pPr marL="457200" indent="-457200">
+              <a:buFont typeface="+mj-lt"/>
+              <a:buAutoNum type="arabicPeriod"/>
+            </a:pPr>
+            <a:r>
+              <a:rPr lang="en-US" sz="2000" dirty="0"/>
+              <a:t>Get ready for parsing XML</a:t>
+            </a:r>
+          </a:p>
+          <a:p>
+            <a:pPr marL="457200" indent="-457200">
+              <a:buFont typeface="+mj-lt"/>
+              <a:buAutoNum type="arabicPeriod"/>
+            </a:pPr>
+            <a:r>
+              <a:rPr lang="en-US" sz="2000" dirty="0"/>
+              <a:t>Implement multiple C# classes that appropriately hide data</a:t>
+            </a:r>
+          </a:p>
+          <a:p>
+            <a:pPr marL="457200" indent="-457200">
+              <a:buFont typeface="+mj-lt"/>
+              <a:buAutoNum type="arabicPeriod"/>
+            </a:pPr>
+            <a:endParaRPr lang="en-US" sz="2000" dirty="0"/>
+          </a:p>
+          <a:p>
+            <a:pPr marL="0" indent="0">
+              <a:buNone/>
+            </a:pPr>
+            <a:endParaRPr lang="en-US" sz="2000" dirty="0"/>
           </a:p>
         </p:txBody>
       </p:sp>
     </p:spTree>
     <p:extLst>
       <p:ext uri="{BB962C8B-B14F-4D97-AF65-F5344CB8AC3E}">
-        <p14:creationId xmlns:p14="http://schemas.microsoft.com/office/powerpoint/2010/main" val="3303290033"/>
+        <p14:creationId xmlns:p14="http://schemas.microsoft.com/office/powerpoint/2010/main" val="1455101819"/>
       </p:ext>
     </p:extLst>
   </p:cSld>
@@ -7286,203 +7282,6 @@
         </p:nvSpPr>
         <p:spPr>
           <a:xfrm>
-            <a:off x="838200" y="365126"/>
-            <a:ext cx="6113662" cy="1409174"/>
-          </a:xfrm>
-        </p:spPr>
-        <p:txBody>
-          <a:bodyPr>
-            <a:normAutofit/>
-          </a:bodyPr>
-          <a:lstStyle/>
-          <a:p>
-            <a:r>
-              <a:rPr lang="en-US" sz="3600" dirty="0"/>
-              <a:t>Object-Oriented Programming</a:t>
-            </a:r>
-            <a:br>
-              <a:rPr lang="en-US" sz="3600" dirty="0"/>
-            </a:br>
-            <a:r>
-              <a:rPr lang="en-US" sz="1800" dirty="0"/>
-              <a:t>Session: Week 7 Session 2 </a:t>
-            </a:r>
-            <a:br>
-              <a:rPr lang="en-US" sz="1800" dirty="0"/>
-            </a:br>
-            <a:r>
-              <a:rPr lang="en-US" sz="1800" dirty="0"/>
-              <a:t>Instructor: Eric Pogue</a:t>
-            </a:r>
-            <a:endParaRPr lang="en-US" sz="1800" b="1" i="1" u="sng" dirty="0"/>
-          </a:p>
-        </p:txBody>
-      </p:sp>
-      <p:pic>
-        <p:nvPicPr>
-          <p:cNvPr id="4" name="Content Placeholder 4"/>
-          <p:cNvPicPr>
-            <a:picLocks noChangeAspect="1"/>
-          </p:cNvPicPr>
-          <p:nvPr/>
-        </p:nvPicPr>
-        <p:blipFill>
-          <a:blip r:embed="rId3"/>
-          <a:stretch>
-            <a:fillRect/>
-          </a:stretch>
-        </p:blipFill>
-        <p:spPr>
-          <a:xfrm>
-            <a:off x="9072894" y="182925"/>
-            <a:ext cx="2656367" cy="1366321"/>
-          </a:xfrm>
-          <a:prstGeom prst="rect">
-            <a:avLst/>
-          </a:prstGeom>
-        </p:spPr>
-      </p:pic>
-      <p:sp>
-        <p:nvSpPr>
-          <p:cNvPr id="10" name="Content Placeholder 2"/>
-          <p:cNvSpPr>
-            <a:spLocks noGrp="1"/>
-          </p:cNvSpPr>
-          <p:nvPr>
-            <p:ph idx="1"/>
-          </p:nvPr>
-        </p:nvSpPr>
-        <p:spPr>
-          <a:xfrm>
-            <a:off x="838200" y="1884313"/>
-            <a:ext cx="10718950" cy="4571242"/>
-          </a:xfrm>
-        </p:spPr>
-        <p:txBody>
-          <a:bodyPr>
-            <a:noAutofit/>
-          </a:bodyPr>
-          <a:lstStyle/>
-          <a:p>
-            <a:pPr marL="0" indent="0">
-              <a:buNone/>
-            </a:pPr>
-            <a:r>
-              <a:rPr lang="en-US" sz="2000" u="sng" dirty="0" err="1"/>
-              <a:t>HideDataDownloadXML</a:t>
-            </a:r>
-            <a:r>
-              <a:rPr lang="en-US" sz="2000" u="sng" dirty="0"/>
-              <a:t> Example:</a:t>
-            </a:r>
-          </a:p>
-          <a:p>
-            <a:pPr marL="457200" indent="-457200">
-              <a:buFont typeface="+mj-lt"/>
-              <a:buAutoNum type="arabicPeriod"/>
-            </a:pPr>
-            <a:r>
-              <a:rPr lang="en-US" sz="2000" dirty="0"/>
-              <a:t>Develop  application entirely in Visual Studio 2017 and C#</a:t>
-            </a:r>
-          </a:p>
-          <a:p>
-            <a:pPr marL="457200" indent="-457200">
-              <a:buFont typeface="+mj-lt"/>
-              <a:buAutoNum type="arabicPeriod"/>
-            </a:pPr>
-            <a:r>
-              <a:rPr lang="en-US" sz="2000" dirty="0"/>
-              <a:t>Take in one command line argument that is the URL to download</a:t>
-            </a:r>
-          </a:p>
-          <a:p>
-            <a:pPr marL="457200" indent="-457200">
-              <a:buFont typeface="+mj-lt"/>
-              <a:buAutoNum type="arabicPeriod"/>
-            </a:pPr>
-            <a:r>
-              <a:rPr lang="en-US" sz="2000" dirty="0"/>
-              <a:t>Utilize Web (HTTP) protocols to download HTML and XML files </a:t>
-            </a:r>
-          </a:p>
-          <a:p>
-            <a:pPr marL="457200" indent="-457200">
-              <a:buFont typeface="+mj-lt"/>
-              <a:buAutoNum type="arabicPeriod"/>
-            </a:pPr>
-            <a:r>
-              <a:rPr lang="en-US" sz="2000" dirty="0"/>
-              <a:t>Get ready for parsing XML</a:t>
-            </a:r>
-          </a:p>
-          <a:p>
-            <a:pPr marL="457200" indent="-457200">
-              <a:buFont typeface="+mj-lt"/>
-              <a:buAutoNum type="arabicPeriod"/>
-            </a:pPr>
-            <a:r>
-              <a:rPr lang="en-US" sz="2000" dirty="0"/>
-              <a:t>Implement multiple C# classes that appropriately hide data</a:t>
-            </a:r>
-          </a:p>
-          <a:p>
-            <a:pPr marL="457200" indent="-457200">
-              <a:buFont typeface="+mj-lt"/>
-              <a:buAutoNum type="arabicPeriod"/>
-            </a:pPr>
-            <a:endParaRPr lang="en-US" sz="2000" dirty="0"/>
-          </a:p>
-          <a:p>
-            <a:pPr marL="0" indent="0">
-              <a:buNone/>
-            </a:pPr>
-            <a:endParaRPr lang="en-US" sz="2000" dirty="0"/>
-          </a:p>
-        </p:txBody>
-      </p:sp>
-    </p:spTree>
-    <p:extLst>
-      <p:ext uri="{BB962C8B-B14F-4D97-AF65-F5344CB8AC3E}">
-        <p14:creationId xmlns:p14="http://schemas.microsoft.com/office/powerpoint/2010/main" val="1455101819"/>
-      </p:ext>
-    </p:extLst>
-  </p:cSld>
-  <p:clrMapOvr>
-    <a:masterClrMapping/>
-  </p:clrMapOvr>
-</p:sld>
-</file>
-
-<file path=ppt/slides/slide21.xml><?xml version="1.0" encoding="utf-8"?>
-<p:sld xmlns:a="http://schemas.openxmlformats.org/drawingml/2006/main" xmlns:r="http://schemas.openxmlformats.org/officeDocument/2006/relationships" xmlns:p="http://schemas.openxmlformats.org/presentationml/2006/main">
-  <p:cSld>
-    <p:spTree>
-      <p:nvGrpSpPr>
-        <p:cNvPr id="1" name=""/>
-        <p:cNvGrpSpPr/>
-        <p:nvPr/>
-      </p:nvGrpSpPr>
-      <p:grpSpPr>
-        <a:xfrm>
-          <a:off x="0" y="0"/>
-          <a:ext cx="0" cy="0"/>
-          <a:chOff x="0" y="0"/>
-          <a:chExt cx="0" cy="0"/>
-        </a:xfrm>
-      </p:grpSpPr>
-      <p:sp>
-        <p:nvSpPr>
-          <p:cNvPr id="2" name="Title 1"/>
-          <p:cNvSpPr>
-            <a:spLocks noGrp="1"/>
-          </p:cNvSpPr>
-          <p:nvPr>
-            <p:ph type="title"/>
-          </p:nvPr>
-        </p:nvSpPr>
-        <p:spPr>
-          <a:xfrm>
             <a:off x="811620" y="365126"/>
             <a:ext cx="10515600" cy="757272"/>
           </a:xfrm>
@@ -7620,7 +7419,7 @@
 </p:sld>
 </file>
 
-<file path=ppt/slides/slide22.xml><?xml version="1.0" encoding="utf-8"?>
+<file path=ppt/slides/slide21.xml><?xml version="1.0" encoding="utf-8"?>
 <p:sld xmlns:a="http://schemas.openxmlformats.org/drawingml/2006/main" xmlns:r="http://schemas.openxmlformats.org/officeDocument/2006/relationships" xmlns:p="http://schemas.openxmlformats.org/presentationml/2006/main">
   <p:cSld>
     <p:bg>
@@ -7740,7 +7539,7 @@
 </p:sld>
 </file>
 
-<file path=ppt/slides/slide23.xml><?xml version="1.0" encoding="utf-8"?>
+<file path=ppt/slides/slide22.xml><?xml version="1.0" encoding="utf-8"?>
 <p:sld xmlns:a="http://schemas.openxmlformats.org/drawingml/2006/main" xmlns:r="http://schemas.openxmlformats.org/officeDocument/2006/relationships" xmlns:p="http://schemas.openxmlformats.org/presentationml/2006/main">
   <p:cSld>
     <p:spTree>
@@ -7955,7 +7754,7 @@
 </p:sld>
 </file>
 
-<file path=ppt/slides/slide24.xml><?xml version="1.0" encoding="utf-8"?>
+<file path=ppt/slides/slide23.xml><?xml version="1.0" encoding="utf-8"?>
 <p:sld xmlns:a="http://schemas.openxmlformats.org/drawingml/2006/main" xmlns:r="http://schemas.openxmlformats.org/officeDocument/2006/relationships" xmlns:p="http://schemas.openxmlformats.org/presentationml/2006/main">
   <p:cSld>
     <p:bg>
@@ -9730,12 +9529,9 @@
 </file>
 
 <file path=customXml/item1.xml><?xml version="1.0" encoding="utf-8"?>
-<?mso-contentType ?>
-<FormTemplates xmlns="http://schemas.microsoft.com/sharepoint/v3/contenttype/forms">
-  <Display>DocumentLibraryForm</Display>
-  <Edit>DocumentLibraryForm</Edit>
-  <New>DocumentLibraryForm</New>
-</FormTemplates>
+<p:properties xmlns:p="http://schemas.microsoft.com/office/2006/metadata/properties" xmlns:xsi="http://www.w3.org/2001/XMLSchema-instance" xmlns:pc="http://schemas.microsoft.com/office/infopath/2007/PartnerControls">
+  <documentManagement/>
+</p:properties>
 </file>
 
 <file path=customXml/item2.xml><?xml version="1.0" encoding="utf-8"?>
@@ -9853,15 +9649,25 @@
 </file>
 
 <file path=customXml/item3.xml><?xml version="1.0" encoding="utf-8"?>
-<p:properties xmlns:p="http://schemas.microsoft.com/office/2006/metadata/properties" xmlns:xsi="http://www.w3.org/2001/XMLSchema-instance" xmlns:pc="http://schemas.microsoft.com/office/infopath/2007/PartnerControls">
-  <documentManagement/>
-</p:properties>
+<?mso-contentType ?>
+<FormTemplates xmlns="http://schemas.microsoft.com/sharepoint/v3/contenttype/forms">
+  <Display>DocumentLibraryForm</Display>
+  <Edit>DocumentLibraryForm</Edit>
+  <New>DocumentLibraryForm</New>
+</FormTemplates>
 </file>
 
 <file path=customXml/itemProps1.xml><?xml version="1.0" encoding="utf-8"?>
-<ds:datastoreItem xmlns:ds="http://schemas.openxmlformats.org/officeDocument/2006/customXml" ds:itemID="{87FD8B20-B89A-4B23-9329-175195DD4D8A}">
+<ds:datastoreItem xmlns:ds="http://schemas.openxmlformats.org/officeDocument/2006/customXml" ds:itemID="{3473EA1A-2744-48E8-B2A3-4F89C0FC849C}">
   <ds:schemaRefs>
-    <ds:schemaRef ds:uri="http://schemas.microsoft.com/sharepoint/v3/contenttype/forms"/>
+    <ds:schemaRef ds:uri="http://purl.org/dc/elements/1.1/"/>
+    <ds:schemaRef ds:uri="http://schemas.microsoft.com/office/2006/metadata/properties"/>
+    <ds:schemaRef ds:uri="http://schemas.microsoft.com/office/2006/documentManagement/types"/>
+    <ds:schemaRef ds:uri="http://purl.org/dc/terms/"/>
+    <ds:schemaRef ds:uri="http://schemas.openxmlformats.org/package/2006/metadata/core-properties"/>
+    <ds:schemaRef ds:uri="http://purl.org/dc/dcmitype/"/>
+    <ds:schemaRef ds:uri="http://schemas.microsoft.com/office/infopath/2007/PartnerControls"/>
+    <ds:schemaRef ds:uri="http://www.w3.org/XML/1998/namespace"/>
   </ds:schemaRefs>
 </ds:datastoreItem>
 </file>
@@ -9883,16 +9689,9 @@
 </file>
 
 <file path=customXml/itemProps3.xml><?xml version="1.0" encoding="utf-8"?>
-<ds:datastoreItem xmlns:ds="http://schemas.openxmlformats.org/officeDocument/2006/customXml" ds:itemID="{3473EA1A-2744-48E8-B2A3-4F89C0FC849C}">
+<ds:datastoreItem xmlns:ds="http://schemas.openxmlformats.org/officeDocument/2006/customXml" ds:itemID="{87FD8B20-B89A-4B23-9329-175195DD4D8A}">
   <ds:schemaRefs>
-    <ds:schemaRef ds:uri="http://purl.org/dc/elements/1.1/"/>
-    <ds:schemaRef ds:uri="http://schemas.microsoft.com/office/2006/metadata/properties"/>
-    <ds:schemaRef ds:uri="http://schemas.microsoft.com/office/2006/documentManagement/types"/>
-    <ds:schemaRef ds:uri="http://purl.org/dc/terms/"/>
-    <ds:schemaRef ds:uri="http://schemas.openxmlformats.org/package/2006/metadata/core-properties"/>
-    <ds:schemaRef ds:uri="http://purl.org/dc/dcmitype/"/>
-    <ds:schemaRef ds:uri="http://schemas.microsoft.com/office/infopath/2007/PartnerControls"/>
-    <ds:schemaRef ds:uri="http://www.w3.org/XML/1998/namespace"/>
+    <ds:schemaRef ds:uri="http://schemas.microsoft.com/sharepoint/v3/contenttype/forms"/>
   </ds:schemaRefs>
 </ds:datastoreItem>
 </file>
</xml_diff>